<commit_message>
Toned down Final Presentation.
</commit_message>
<xml_diff>
--- a/docs/Final Presentation.pptx
+++ b/docs/Final Presentation.pptx
@@ -202,7 +202,7 @@
           <a:p>
             <a:fld id="{EB022DA7-AFEC-477E-9A2A-AFE645E90FD7}" type="datetimeFigureOut">
               <a:rPr lang="en-US" smtClean="0"/>
-              <a:t>11/8/2011</a:t>
+              <a:t>11/9/2011</a:t>
             </a:fld>
             <a:endParaRPr lang="en-US"/>
           </a:p>
@@ -747,7 +747,7 @@
           <a:p>
             <a:fld id="{9FFDD6E3-5480-4076-8303-CADEEEE76510}" type="datetimeFigureOut">
               <a:rPr lang="en-US" smtClean="0"/>
-              <a:t>11/8/2011</a:t>
+              <a:t>11/9/2011</a:t>
             </a:fld>
             <a:endParaRPr lang="en-US"/>
           </a:p>
@@ -900,25 +900,15 @@
   <p:clrMapOvr>
     <a:masterClrMapping/>
   </p:clrMapOvr>
-  <mc:AlternateContent xmlns:mc="http://schemas.openxmlformats.org/markup-compatibility/2006">
-    <mc:Choice xmlns:p14="http://schemas.microsoft.com/office/powerpoint/2010/main" Requires="p14">
+  <mc:AlternateContent xmlns:mc="http://schemas.openxmlformats.org/markup-compatibility/2006" xmlns:p14="http://schemas.microsoft.com/office/powerpoint/2010/main">
+    <mc:Choice Requires="p14">
       <p:transition spd="slow" p14:dur="1250">
         <p14:flythrough hasBounce="1"/>
-        <p:sndAc>
-          <p:stSnd>
-            <p:snd r:embed="rId1" name="chimes.wav"/>
-          </p:stSnd>
-        </p:sndAc>
       </p:transition>
     </mc:Choice>
-    <mc:Fallback>
+    <mc:Fallback xmlns="">
       <p:transition spd="slow">
         <p:fade/>
-        <p:sndAc>
-          <p:stSnd>
-            <p:snd r:embed="rId1" name="chimes.wav"/>
-          </p:stSnd>
-        </p:sndAc>
       </p:transition>
     </mc:Fallback>
   </mc:AlternateContent>
@@ -1034,7 +1024,7 @@
           <a:p>
             <a:fld id="{9FFDD6E3-5480-4076-8303-CADEEEE76510}" type="datetimeFigureOut">
               <a:rPr lang="en-US" smtClean="0"/>
-              <a:t>11/8/2011</a:t>
+              <a:t>11/9/2011</a:t>
             </a:fld>
             <a:endParaRPr lang="en-US"/>
           </a:p>
@@ -1087,25 +1077,15 @@
   <p:clrMapOvr>
     <a:masterClrMapping/>
   </p:clrMapOvr>
-  <mc:AlternateContent xmlns:mc="http://schemas.openxmlformats.org/markup-compatibility/2006">
-    <mc:Choice xmlns:p14="http://schemas.microsoft.com/office/powerpoint/2010/main" Requires="p14">
+  <mc:AlternateContent xmlns:mc="http://schemas.openxmlformats.org/markup-compatibility/2006" xmlns:p14="http://schemas.microsoft.com/office/powerpoint/2010/main">
+    <mc:Choice Requires="p14">
       <p:transition spd="slow" p14:dur="1250">
         <p14:flythrough hasBounce="1"/>
-        <p:sndAc>
-          <p:stSnd>
-            <p:snd r:embed="rId1" name="chimes.wav"/>
-          </p:stSnd>
-        </p:sndAc>
       </p:transition>
     </mc:Choice>
-    <mc:Fallback>
+    <mc:Fallback xmlns="">
       <p:transition spd="slow">
         <p:fade/>
-        <p:sndAc>
-          <p:stSnd>
-            <p:snd r:embed="rId1" name="chimes.wav"/>
-          </p:stSnd>
-        </p:sndAc>
       </p:transition>
     </mc:Fallback>
   </mc:AlternateContent>
@@ -1231,7 +1211,7 @@
           <a:p>
             <a:fld id="{9FFDD6E3-5480-4076-8303-CADEEEE76510}" type="datetimeFigureOut">
               <a:rPr lang="en-US" smtClean="0"/>
-              <a:t>11/8/2011</a:t>
+              <a:t>11/9/2011</a:t>
             </a:fld>
             <a:endParaRPr lang="en-US"/>
           </a:p>
@@ -1284,25 +1264,15 @@
   <p:clrMapOvr>
     <a:masterClrMapping/>
   </p:clrMapOvr>
-  <mc:AlternateContent xmlns:mc="http://schemas.openxmlformats.org/markup-compatibility/2006">
-    <mc:Choice xmlns:p14="http://schemas.microsoft.com/office/powerpoint/2010/main" Requires="p14">
+  <mc:AlternateContent xmlns:mc="http://schemas.openxmlformats.org/markup-compatibility/2006" xmlns:p14="http://schemas.microsoft.com/office/powerpoint/2010/main">
+    <mc:Choice Requires="p14">
       <p:transition spd="slow" p14:dur="1250">
         <p14:flythrough hasBounce="1"/>
-        <p:sndAc>
-          <p:stSnd>
-            <p:snd r:embed="rId1" name="chimes.wav"/>
-          </p:stSnd>
-        </p:sndAc>
       </p:transition>
     </mc:Choice>
-    <mc:Fallback>
+    <mc:Fallback xmlns="">
       <p:transition spd="slow">
         <p:fade/>
-        <p:sndAc>
-          <p:stSnd>
-            <p:snd r:embed="rId1" name="chimes.wav"/>
-          </p:stSnd>
-        </p:sndAc>
       </p:transition>
     </mc:Fallback>
   </mc:AlternateContent>
@@ -1418,7 +1388,7 @@
           <a:p>
             <a:fld id="{9FFDD6E3-5480-4076-8303-CADEEEE76510}" type="datetimeFigureOut">
               <a:rPr lang="en-US" smtClean="0"/>
-              <a:t>11/8/2011</a:t>
+              <a:t>11/9/2011</a:t>
             </a:fld>
             <a:endParaRPr lang="en-US"/>
           </a:p>
@@ -1471,25 +1441,15 @@
   <p:clrMapOvr>
     <a:masterClrMapping/>
   </p:clrMapOvr>
-  <mc:AlternateContent xmlns:mc="http://schemas.openxmlformats.org/markup-compatibility/2006">
-    <mc:Choice xmlns:p14="http://schemas.microsoft.com/office/powerpoint/2010/main" Requires="p14">
+  <mc:AlternateContent xmlns:mc="http://schemas.openxmlformats.org/markup-compatibility/2006" xmlns:p14="http://schemas.microsoft.com/office/powerpoint/2010/main">
+    <mc:Choice Requires="p14">
       <p:transition spd="slow" p14:dur="1250">
         <p14:flythrough hasBounce="1"/>
-        <p:sndAc>
-          <p:stSnd>
-            <p:snd r:embed="rId1" name="chimes.wav"/>
-          </p:stSnd>
-        </p:sndAc>
       </p:transition>
     </mc:Choice>
-    <mc:Fallback>
+    <mc:Fallback xmlns="">
       <p:transition spd="slow">
         <p:fade/>
-        <p:sndAc>
-          <p:stSnd>
-            <p:snd r:embed="rId1" name="chimes.wav"/>
-          </p:stSnd>
-        </p:sndAc>
       </p:transition>
     </mc:Fallback>
   </mc:AlternateContent>
@@ -1689,7 +1649,7 @@
           <a:p>
             <a:fld id="{9FFDD6E3-5480-4076-8303-CADEEEE76510}" type="datetimeFigureOut">
               <a:rPr lang="en-US" smtClean="0"/>
-              <a:t>11/8/2011</a:t>
+              <a:t>11/9/2011</a:t>
             </a:fld>
             <a:endParaRPr lang="en-US"/>
           </a:p>
@@ -1742,25 +1702,15 @@
   <p:clrMapOvr>
     <a:masterClrMapping/>
   </p:clrMapOvr>
-  <mc:AlternateContent xmlns:mc="http://schemas.openxmlformats.org/markup-compatibility/2006">
-    <mc:Choice xmlns:p14="http://schemas.microsoft.com/office/powerpoint/2010/main" Requires="p14">
+  <mc:AlternateContent xmlns:mc="http://schemas.openxmlformats.org/markup-compatibility/2006" xmlns:p14="http://schemas.microsoft.com/office/powerpoint/2010/main">
+    <mc:Choice Requires="p14">
       <p:transition spd="slow" p14:dur="1250">
         <p14:flythrough hasBounce="1"/>
-        <p:sndAc>
-          <p:stSnd>
-            <p:snd r:embed="rId1" name="chimes.wav"/>
-          </p:stSnd>
-        </p:sndAc>
       </p:transition>
     </mc:Choice>
-    <mc:Fallback>
+    <mc:Fallback xmlns="">
       <p:transition spd="slow">
         <p:fade/>
-        <p:sndAc>
-          <p:stSnd>
-            <p:snd r:embed="rId1" name="chimes.wav"/>
-          </p:stSnd>
-        </p:sndAc>
       </p:transition>
     </mc:Fallback>
   </mc:AlternateContent>
@@ -1994,7 +1944,7 @@
           <a:p>
             <a:fld id="{9FFDD6E3-5480-4076-8303-CADEEEE76510}" type="datetimeFigureOut">
               <a:rPr lang="en-US" smtClean="0"/>
-              <a:t>11/8/2011</a:t>
+              <a:t>11/9/2011</a:t>
             </a:fld>
             <a:endParaRPr lang="en-US"/>
           </a:p>
@@ -2047,25 +1997,15 @@
   <p:clrMapOvr>
     <a:masterClrMapping/>
   </p:clrMapOvr>
-  <mc:AlternateContent xmlns:mc="http://schemas.openxmlformats.org/markup-compatibility/2006">
-    <mc:Choice xmlns:p14="http://schemas.microsoft.com/office/powerpoint/2010/main" Requires="p14">
+  <mc:AlternateContent xmlns:mc="http://schemas.openxmlformats.org/markup-compatibility/2006" xmlns:p14="http://schemas.microsoft.com/office/powerpoint/2010/main">
+    <mc:Choice Requires="p14">
       <p:transition spd="slow" p14:dur="1250">
         <p14:flythrough hasBounce="1"/>
-        <p:sndAc>
-          <p:stSnd>
-            <p:snd r:embed="rId1" name="chimes.wav"/>
-          </p:stSnd>
-        </p:sndAc>
       </p:transition>
     </mc:Choice>
-    <mc:Fallback>
+    <mc:Fallback xmlns="">
       <p:transition spd="slow">
         <p:fade/>
-        <p:sndAc>
-          <p:stSnd>
-            <p:snd r:embed="rId1" name="chimes.wav"/>
-          </p:stSnd>
-        </p:sndAc>
       </p:transition>
     </mc:Fallback>
   </mc:AlternateContent>
@@ -2455,7 +2395,7 @@
           <a:p>
             <a:fld id="{9FFDD6E3-5480-4076-8303-CADEEEE76510}" type="datetimeFigureOut">
               <a:rPr lang="en-US" smtClean="0"/>
-              <a:t>11/8/2011</a:t>
+              <a:t>11/9/2011</a:t>
             </a:fld>
             <a:endParaRPr lang="en-US"/>
           </a:p>
@@ -2508,25 +2448,15 @@
   <p:clrMapOvr>
     <a:masterClrMapping/>
   </p:clrMapOvr>
-  <mc:AlternateContent xmlns:mc="http://schemas.openxmlformats.org/markup-compatibility/2006">
-    <mc:Choice xmlns:p14="http://schemas.microsoft.com/office/powerpoint/2010/main" Requires="p14">
+  <mc:AlternateContent xmlns:mc="http://schemas.openxmlformats.org/markup-compatibility/2006" xmlns:p14="http://schemas.microsoft.com/office/powerpoint/2010/main">
+    <mc:Choice Requires="p14">
       <p:transition spd="slow" p14:dur="1250">
         <p14:flythrough hasBounce="1"/>
-        <p:sndAc>
-          <p:stSnd>
-            <p:snd r:embed="rId1" name="chimes.wav"/>
-          </p:stSnd>
-        </p:sndAc>
       </p:transition>
     </mc:Choice>
-    <mc:Fallback>
+    <mc:Fallback xmlns="">
       <p:transition spd="slow">
         <p:fade/>
-        <p:sndAc>
-          <p:stSnd>
-            <p:snd r:embed="rId1" name="chimes.wav"/>
-          </p:stSnd>
-        </p:sndAc>
       </p:transition>
     </mc:Fallback>
   </mc:AlternateContent>
@@ -2590,7 +2520,7 @@
           <a:p>
             <a:fld id="{9FFDD6E3-5480-4076-8303-CADEEEE76510}" type="datetimeFigureOut">
               <a:rPr lang="en-US" smtClean="0"/>
-              <a:t>11/8/2011</a:t>
+              <a:t>11/9/2011</a:t>
             </a:fld>
             <a:endParaRPr lang="en-US"/>
           </a:p>
@@ -2643,25 +2573,15 @@
   <p:clrMapOvr>
     <a:masterClrMapping/>
   </p:clrMapOvr>
-  <mc:AlternateContent xmlns:mc="http://schemas.openxmlformats.org/markup-compatibility/2006">
-    <mc:Choice xmlns:p14="http://schemas.microsoft.com/office/powerpoint/2010/main" Requires="p14">
+  <mc:AlternateContent xmlns:mc="http://schemas.openxmlformats.org/markup-compatibility/2006" xmlns:p14="http://schemas.microsoft.com/office/powerpoint/2010/main">
+    <mc:Choice Requires="p14">
       <p:transition spd="slow" p14:dur="1250">
         <p14:flythrough hasBounce="1"/>
-        <p:sndAc>
-          <p:stSnd>
-            <p:snd r:embed="rId1" name="chimes.wav"/>
-          </p:stSnd>
-        </p:sndAc>
       </p:transition>
     </mc:Choice>
-    <mc:Fallback>
+    <mc:Fallback xmlns="">
       <p:transition spd="slow">
         <p:fade/>
-        <p:sndAc>
-          <p:stSnd>
-            <p:snd r:embed="rId1" name="chimes.wav"/>
-          </p:stSnd>
-        </p:sndAc>
       </p:transition>
     </mc:Fallback>
   </mc:AlternateContent>
@@ -2702,7 +2622,7 @@
           <a:p>
             <a:fld id="{9FFDD6E3-5480-4076-8303-CADEEEE76510}" type="datetimeFigureOut">
               <a:rPr lang="en-US" smtClean="0"/>
-              <a:t>11/8/2011</a:t>
+              <a:t>11/9/2011</a:t>
             </a:fld>
             <a:endParaRPr lang="en-US"/>
           </a:p>
@@ -2755,25 +2675,15 @@
   <p:clrMapOvr>
     <a:masterClrMapping/>
   </p:clrMapOvr>
-  <mc:AlternateContent xmlns:mc="http://schemas.openxmlformats.org/markup-compatibility/2006">
-    <mc:Choice xmlns:p14="http://schemas.microsoft.com/office/powerpoint/2010/main" Requires="p14">
+  <mc:AlternateContent xmlns:mc="http://schemas.openxmlformats.org/markup-compatibility/2006" xmlns:p14="http://schemas.microsoft.com/office/powerpoint/2010/main">
+    <mc:Choice Requires="p14">
       <p:transition spd="slow" p14:dur="1250">
         <p14:flythrough hasBounce="1"/>
-        <p:sndAc>
-          <p:stSnd>
-            <p:snd r:embed="rId1" name="chimes.wav"/>
-          </p:stSnd>
-        </p:sndAc>
       </p:transition>
     </mc:Choice>
-    <mc:Fallback>
+    <mc:Fallback xmlns="">
       <p:transition spd="slow">
         <p:fade/>
-        <p:sndAc>
-          <p:stSnd>
-            <p:snd r:embed="rId1" name="chimes.wav"/>
-          </p:stSnd>
-        </p:sndAc>
       </p:transition>
     </mc:Fallback>
   </mc:AlternateContent>
@@ -2966,7 +2876,7 @@
           <a:p>
             <a:fld id="{9FFDD6E3-5480-4076-8303-CADEEEE76510}" type="datetimeFigureOut">
               <a:rPr lang="en-US" smtClean="0"/>
-              <a:t>11/8/2011</a:t>
+              <a:t>11/9/2011</a:t>
             </a:fld>
             <a:endParaRPr lang="en-US"/>
           </a:p>
@@ -3042,25 +2952,15 @@
   <p:clrMapOvr>
     <a:masterClrMapping/>
   </p:clrMapOvr>
-  <mc:AlternateContent xmlns:mc="http://schemas.openxmlformats.org/markup-compatibility/2006">
-    <mc:Choice xmlns:p14="http://schemas.microsoft.com/office/powerpoint/2010/main" Requires="p14">
+  <mc:AlternateContent xmlns:mc="http://schemas.openxmlformats.org/markup-compatibility/2006" xmlns:p14="http://schemas.microsoft.com/office/powerpoint/2010/main">
+    <mc:Choice Requires="p14">
       <p:transition spd="slow" p14:dur="1250">
         <p14:flythrough hasBounce="1"/>
-        <p:sndAc>
-          <p:stSnd>
-            <p:snd r:embed="rId1" name="chimes.wav"/>
-          </p:stSnd>
-        </p:sndAc>
       </p:transition>
     </mc:Choice>
-    <mc:Fallback>
+    <mc:Fallback xmlns="">
       <p:transition spd="slow">
         <p:fade/>
-        <p:sndAc>
-          <p:stSnd>
-            <p:snd r:embed="rId1" name="chimes.wav"/>
-          </p:stSnd>
-        </p:sndAc>
       </p:transition>
     </mc:Fallback>
   </mc:AlternateContent>
@@ -3282,7 +3182,7 @@
           <a:p>
             <a:fld id="{9FFDD6E3-5480-4076-8303-CADEEEE76510}" type="datetimeFigureOut">
               <a:rPr lang="en-US" smtClean="0"/>
-              <a:t>11/8/2011</a:t>
+              <a:t>11/9/2011</a:t>
             </a:fld>
             <a:endParaRPr lang="en-US"/>
           </a:p>
@@ -3423,25 +3323,15 @@
   <p:clrMapOvr>
     <a:masterClrMapping/>
   </p:clrMapOvr>
-  <mc:AlternateContent xmlns:mc="http://schemas.openxmlformats.org/markup-compatibility/2006">
-    <mc:Choice xmlns:p14="http://schemas.microsoft.com/office/powerpoint/2010/main" Requires="p14">
+  <mc:AlternateContent xmlns:mc="http://schemas.openxmlformats.org/markup-compatibility/2006" xmlns:p14="http://schemas.microsoft.com/office/powerpoint/2010/main">
+    <mc:Choice Requires="p14">
       <p:transition spd="slow" p14:dur="1250">
         <p14:flythrough hasBounce="1"/>
-        <p:sndAc>
-          <p:stSnd>
-            <p:snd r:embed="rId1" name="chimes.wav"/>
-          </p:stSnd>
-        </p:sndAc>
       </p:transition>
     </mc:Choice>
-    <mc:Fallback>
+    <mc:Fallback xmlns="">
       <p:transition spd="slow">
         <p:fade/>
-        <p:sndAc>
-          <p:stSnd>
-            <p:snd r:embed="rId1" name="chimes.wav"/>
-          </p:stSnd>
-        </p:sndAc>
       </p:transition>
     </mc:Fallback>
   </mc:AlternateContent>
@@ -3598,7 +3488,7 @@
           <a:p>
             <a:fld id="{9FFDD6E3-5480-4076-8303-CADEEEE76510}" type="datetimeFigureOut">
               <a:rPr lang="en-US" smtClean="0"/>
-              <a:t>11/8/2011</a:t>
+              <a:t>11/9/2011</a:t>
             </a:fld>
             <a:endParaRPr lang="en-US"/>
           </a:p>
@@ -3786,25 +3676,15 @@
     <p:sldLayoutId id="2147483670" r:id="rId10"/>
     <p:sldLayoutId id="2147483671" r:id="rId11"/>
   </p:sldLayoutIdLst>
-  <mc:AlternateContent xmlns:mc="http://schemas.openxmlformats.org/markup-compatibility/2006">
-    <mc:Choice xmlns:p14="http://schemas.microsoft.com/office/powerpoint/2010/main" Requires="p14">
+  <mc:AlternateContent xmlns:mc="http://schemas.openxmlformats.org/markup-compatibility/2006" xmlns:p14="http://schemas.microsoft.com/office/powerpoint/2010/main">
+    <mc:Choice Requires="p14">
       <p:transition spd="slow" p14:dur="1250">
         <p14:flythrough hasBounce="1"/>
-        <p:sndAc>
-          <p:stSnd>
-            <p:snd r:embed="rId13" name="chimes.wav"/>
-          </p:stSnd>
-        </p:sndAc>
       </p:transition>
     </mc:Choice>
-    <mc:Fallback>
+    <mc:Fallback xmlns="">
       <p:transition spd="slow">
         <p:fade/>
-        <p:sndAc>
-          <p:stSnd>
-            <p:snd r:embed="rId13" name="chimes.wav"/>
-          </p:stSnd>
-        </p:sndAc>
       </p:transition>
     </mc:Fallback>
   </mc:AlternateContent>
@@ -4227,11 +4107,6 @@
               </a:rPr>
               <a:t>yourself</a:t>
             </a:r>
-            <a:endParaRPr lang="en-US" sz="3600" spc="-60" dirty="0">
-              <a:solidFill>
-                <a:schemeClr val="tx2"/>
-              </a:solidFill>
-            </a:endParaRPr>
           </a:p>
         </p:txBody>
       </p:sp>
@@ -4245,25 +4120,15 @@
   <p:clrMapOvr>
     <a:masterClrMapping/>
   </p:clrMapOvr>
-  <mc:AlternateContent xmlns:mc="http://schemas.openxmlformats.org/markup-compatibility/2006">
-    <mc:Choice xmlns:p14="http://schemas.microsoft.com/office/powerpoint/2010/main" Requires="p14">
+  <mc:AlternateContent xmlns:mc="http://schemas.openxmlformats.org/markup-compatibility/2006" xmlns:p14="http://schemas.microsoft.com/office/powerpoint/2010/main">
+    <mc:Choice Requires="p14">
       <p:transition spd="slow" p14:dur="1250">
         <p14:flythrough hasBounce="1"/>
-        <p:sndAc>
-          <p:stSnd>
-            <p:snd r:embed="rId2" name="chimes.wav"/>
-          </p:stSnd>
-        </p:sndAc>
       </p:transition>
     </mc:Choice>
-    <mc:Fallback>
+    <mc:Fallback xmlns="">
       <p:transition spd="slow">
         <p:fade/>
-        <p:sndAc>
-          <p:stSnd>
-            <p:snd r:embed="rId2" name="chimes.wav"/>
-          </p:stSnd>
-        </p:sndAc>
       </p:transition>
     </mc:Fallback>
   </mc:AlternateContent>
@@ -4303,7 +4168,7 @@
           <p:nvPr/>
         </p:nvPicPr>
         <p:blipFill>
-          <a:blip r:embed="rId4">
+          <a:blip r:embed="rId3">
             <a:extLst>
               <a:ext uri="{28A0092B-C50C-407E-A947-70E740481C1C}">
                 <a14:useLocalDpi xmlns:a14="http://schemas.microsoft.com/office/drawing/2010/main" val="0"/>
@@ -4377,7 +4242,7 @@
           <a:p>
             <a:pPr marL="342900" indent="-342900">
               <a:buBlip>
-                <a:blip r:embed="rId5"/>
+                <a:blip r:embed="rId4"/>
               </a:buBlip>
             </a:pPr>
             <a:r>
@@ -4396,7 +4261,7 @@
           <a:p>
             <a:pPr marL="342900" indent="-342900">
               <a:buBlip>
-                <a:blip r:embed="rId5"/>
+                <a:blip r:embed="rId4"/>
               </a:buBlip>
             </a:pPr>
             <a:r>
@@ -4407,7 +4272,7 @@
           <a:p>
             <a:pPr marL="342900" indent="-342900">
               <a:buBlip>
-                <a:blip r:embed="rId5"/>
+                <a:blip r:embed="rId4"/>
               </a:buBlip>
             </a:pPr>
             <a:r>
@@ -4436,25 +4301,15 @@
   <p:clrMapOvr>
     <a:masterClrMapping/>
   </p:clrMapOvr>
-  <mc:AlternateContent xmlns:mc="http://schemas.openxmlformats.org/markup-compatibility/2006">
-    <mc:Choice xmlns:p14="http://schemas.microsoft.com/office/powerpoint/2010/main" Requires="p14">
+  <mc:AlternateContent xmlns:mc="http://schemas.openxmlformats.org/markup-compatibility/2006" xmlns:p14="http://schemas.microsoft.com/office/powerpoint/2010/main">
+    <mc:Choice Requires="p14">
       <p:transition spd="slow" p14:dur="1250">
         <p14:flythrough hasBounce="1"/>
-        <p:sndAc>
-          <p:stSnd>
-            <p:snd r:embed="rId2" name="chimes.wav"/>
-          </p:stSnd>
-        </p:sndAc>
       </p:transition>
     </mc:Choice>
-    <mc:Fallback>
+    <mc:Fallback xmlns="">
       <p:transition spd="slow">
         <p:fade/>
-        <p:sndAc>
-          <p:stSnd>
-            <p:snd r:embed="rId2" name="chimes.wav"/>
-          </p:stSnd>
-        </p:sndAc>
       </p:transition>
     </mc:Fallback>
   </mc:AlternateContent>
@@ -4771,7 +4626,7 @@
                                           </p:endCondLst>
                                         </p:cTn>
                                         <p:tgtEl>
-                                          <p:sndTgt r:embed="rId3" name="applause.wav"/>
+                                          <p:sndTgt r:embed="rId2" name="applause.wav"/>
                                         </p:tgtEl>
                                       </p:cMediaNode>
                                     </p:audio>
@@ -4895,23 +4750,16 @@
           <a:p>
             <a:pPr marL="342900" indent="-342900">
               <a:buBlip>
-                <a:blip r:embed="rId3"/>
+                <a:blip r:embed="rId2"/>
               </a:buBlip>
             </a:pPr>
             <a:r>
+              <a:rPr lang="en-US" smtClean="0"/>
+              <a:t>Actually </a:t>
+            </a:r>
+            <a:r>
               <a:rPr lang="en-US" dirty="0" smtClean="0"/>
-              <a:t>Take this presentation more seriously</a:t>
-            </a:r>
-          </a:p>
-          <a:p>
-            <a:pPr marL="342900" indent="-342900">
-              <a:buBlip>
-                <a:blip r:embed="rId3"/>
-              </a:buBlip>
-            </a:pPr>
-            <a:r>
-              <a:rPr lang="en-US" dirty="0" smtClean="0"/>
-              <a:t>Actually start coding the project</a:t>
+              <a:t>start coding the project</a:t>
             </a:r>
             <a:endParaRPr lang="en-US" dirty="0"/>
           </a:p>
@@ -4927,25 +4775,15 @@
   <p:clrMapOvr>
     <a:masterClrMapping/>
   </p:clrMapOvr>
-  <mc:AlternateContent xmlns:mc="http://schemas.openxmlformats.org/markup-compatibility/2006">
-    <mc:Choice xmlns:p14="http://schemas.microsoft.com/office/powerpoint/2010/main" Requires="p14">
+  <mc:AlternateContent xmlns:mc="http://schemas.openxmlformats.org/markup-compatibility/2006" xmlns:p14="http://schemas.microsoft.com/office/powerpoint/2010/main">
+    <mc:Choice Requires="p14">
       <p:transition spd="slow" p14:dur="1250">
         <p14:flythrough hasBounce="1"/>
-        <p:sndAc>
-          <p:stSnd>
-            <p:snd r:embed="rId2" name="chimes.wav"/>
-          </p:stSnd>
-        </p:sndAc>
       </p:transition>
     </mc:Choice>
-    <mc:Fallback>
+    <mc:Fallback xmlns="">
       <p:transition spd="slow">
         <p:fade/>
-        <p:sndAc>
-          <p:stSnd>
-            <p:snd r:embed="rId2" name="chimes.wav"/>
-          </p:stSnd>
-        </p:sndAc>
       </p:transition>
     </mc:Fallback>
   </mc:AlternateContent>
@@ -4973,7 +4811,7 @@
                             </p:stCondLst>
                             <p:childTnLst>
                               <p:par>
-                                <p:cTn id="5" presetID="34" presetClass="emph" presetSubtype="0" fill="hold" nodeType="withEffect">
+                                <p:cTn id="5" presetID="34" presetClass="emph" presetSubtype="0" fill="hold" nodeType="afterEffect">
                                   <p:stCondLst>
                                     <p:cond delay="0"/>
                                   </p:stCondLst>
@@ -5069,123 +4907,6 @@
                                           <p:spTgt spid="3">
                                             <p:txEl>
                                               <p:pRg st="0" end="0"/>
-                                            </p:txEl>
-                                          </p:spTgt>
-                                        </p:tgtEl>
-                                        <p:attrNameLst>
-                                          <p:attrName>r</p:attrName>
-                                        </p:attrNameLst>
-                                      </p:cBhvr>
-                                    </p:animRot>
-                                  </p:childTnLst>
-                                </p:cTn>
-                              </p:par>
-                            </p:childTnLst>
-                          </p:cTn>
-                        </p:par>
-                        <p:par>
-                          <p:cTn id="11" fill="hold">
-                            <p:stCondLst>
-                              <p:cond delay="2100"/>
-                            </p:stCondLst>
-                            <p:childTnLst>
-                              <p:par>
-                                <p:cTn id="12" presetID="34" presetClass="emph" presetSubtype="0" fill="hold" nodeType="afterEffect">
-                                  <p:stCondLst>
-                                    <p:cond delay="0"/>
-                                  </p:stCondLst>
-                                  <p:iterate type="lt">
-                                    <p:tmPct val="10000"/>
-                                  </p:iterate>
-                                  <p:childTnLst>
-                                    <p:animMotion origin="layout" path="M 0.0 0.0 L 0.0 -0.07213" pathEditMode="relative" ptsTypes="">
-                                      <p:cBhvr>
-                                        <p:cTn id="13" dur="250" accel="50000" decel="50000" autoRev="1" fill="hold">
-                                          <p:stCondLst>
-                                            <p:cond delay="0"/>
-                                          </p:stCondLst>
-                                        </p:cTn>
-                                        <p:tgtEl>
-                                          <p:spTgt spid="3">
-                                            <p:txEl>
-                                              <p:pRg st="1" end="1"/>
-                                            </p:txEl>
-                                          </p:spTgt>
-                                        </p:tgtEl>
-                                        <p:attrNameLst>
-                                          <p:attrName>ppt_x</p:attrName>
-                                          <p:attrName>ppt_y</p:attrName>
-                                        </p:attrNameLst>
-                                      </p:cBhvr>
-                                    </p:animMotion>
-                                    <p:animRot by="1500000">
-                                      <p:cBhvr>
-                                        <p:cTn id="14" dur="125" fill="hold">
-                                          <p:stCondLst>
-                                            <p:cond delay="0"/>
-                                          </p:stCondLst>
-                                        </p:cTn>
-                                        <p:tgtEl>
-                                          <p:spTgt spid="3">
-                                            <p:txEl>
-                                              <p:pRg st="1" end="1"/>
-                                            </p:txEl>
-                                          </p:spTgt>
-                                        </p:tgtEl>
-                                        <p:attrNameLst>
-                                          <p:attrName>r</p:attrName>
-                                        </p:attrNameLst>
-                                      </p:cBhvr>
-                                    </p:animRot>
-                                    <p:animRot by="-1500000">
-                                      <p:cBhvr>
-                                        <p:cTn id="15" dur="125" fill="hold">
-                                          <p:stCondLst>
-                                            <p:cond delay="125"/>
-                                          </p:stCondLst>
-                                        </p:cTn>
-                                        <p:tgtEl>
-                                          <p:spTgt spid="3">
-                                            <p:txEl>
-                                              <p:pRg st="1" end="1"/>
-                                            </p:txEl>
-                                          </p:spTgt>
-                                        </p:tgtEl>
-                                        <p:attrNameLst>
-                                          <p:attrName>r</p:attrName>
-                                        </p:attrNameLst>
-                                      </p:cBhvr>
-                                    </p:animRot>
-                                    <p:animRot by="-1500000">
-                                      <p:cBhvr>
-                                        <p:cTn id="16" dur="125" fill="hold">
-                                          <p:stCondLst>
-                                            <p:cond delay="250"/>
-                                          </p:stCondLst>
-                                        </p:cTn>
-                                        <p:tgtEl>
-                                          <p:spTgt spid="3">
-                                            <p:txEl>
-                                              <p:pRg st="1" end="1"/>
-                                            </p:txEl>
-                                          </p:spTgt>
-                                        </p:tgtEl>
-                                        <p:attrNameLst>
-                                          <p:attrName>r</p:attrName>
-                                        </p:attrNameLst>
-                                      </p:cBhvr>
-                                    </p:animRot>
-                                    <p:animRot by="1500000">
-                                      <p:cBhvr>
-                                        <p:cTn id="17" dur="125" fill="hold">
-                                          <p:stCondLst>
-                                            <p:cond delay="375"/>
-                                          </p:stCondLst>
-                                        </p:cTn>
-                                        <p:tgtEl>
-                                          <p:spTgt spid="3">
-                                            <p:txEl>
-                                              <p:pRg st="1" end="1"/>
                                             </p:txEl>
                                           </p:spTgt>
                                         </p:tgtEl>
@@ -5288,13 +5009,13 @@
             <a:pPr algn="ctr"/>
             <a:r>
               <a:rPr lang="en-US" sz="13800" dirty="0" err="1" smtClean="0">
-                <a:hlinkClick r:id="rId3"/>
+                <a:hlinkClick r:id="rId2"/>
               </a:rPr>
               <a:t>Sifteo</a:t>
             </a:r>
             <a:r>
               <a:rPr lang="en-US" sz="13800" dirty="0" smtClean="0">
-                <a:hlinkClick r:id="rId3"/>
+                <a:hlinkClick r:id="rId2"/>
               </a:rPr>
               <a:t> Cubes</a:t>
             </a:r>
@@ -5312,25 +5033,15 @@
   <p:clrMapOvr>
     <a:masterClrMapping/>
   </p:clrMapOvr>
-  <mc:AlternateContent xmlns:mc="http://schemas.openxmlformats.org/markup-compatibility/2006">
-    <mc:Choice xmlns:p14="http://schemas.microsoft.com/office/powerpoint/2010/main" Requires="p14">
+  <mc:AlternateContent xmlns:mc="http://schemas.openxmlformats.org/markup-compatibility/2006" xmlns:p14="http://schemas.microsoft.com/office/powerpoint/2010/main">
+    <mc:Choice Requires="p14">
       <p:transition spd="slow" p14:dur="1250">
         <p14:flythrough hasBounce="1"/>
-        <p:sndAc>
-          <p:stSnd>
-            <p:snd r:embed="rId2" name="chimes.wav"/>
-          </p:stSnd>
-        </p:sndAc>
       </p:transition>
     </mc:Choice>
-    <mc:Fallback>
+    <mc:Fallback xmlns="">
       <p:transition spd="slow">
         <p:fade/>
-        <p:sndAc>
-          <p:stSnd>
-            <p:snd r:embed="rId2" name="chimes.wav"/>
-          </p:stSnd>
-        </p:sndAc>
       </p:transition>
     </mc:Fallback>
   </mc:AlternateContent>
@@ -5395,7 +5106,7 @@
           </p:nvPr>
         </p:nvPicPr>
         <p:blipFill>
-          <a:blip r:embed="rId3">
+          <a:blip r:embed="rId2">
             <a:extLst>
               <a:ext uri="{28A0092B-C50C-407E-A947-70E740481C1C}">
                 <a14:useLocalDpi xmlns:a14="http://schemas.microsoft.com/office/drawing/2010/main" val="0"/>
@@ -5437,25 +5148,15 @@
   <p:clrMapOvr>
     <a:masterClrMapping/>
   </p:clrMapOvr>
-  <mc:AlternateContent xmlns:mc="http://schemas.openxmlformats.org/markup-compatibility/2006">
-    <mc:Choice xmlns:p14="http://schemas.microsoft.com/office/powerpoint/2010/main" Requires="p14">
+  <mc:AlternateContent xmlns:mc="http://schemas.openxmlformats.org/markup-compatibility/2006" xmlns:p14="http://schemas.microsoft.com/office/powerpoint/2010/main">
+    <mc:Choice Requires="p14">
       <p:transition spd="slow" p14:dur="1250">
         <p14:flythrough hasBounce="1"/>
-        <p:sndAc>
-          <p:stSnd>
-            <p:snd r:embed="rId2" name="chimes.wav"/>
-          </p:stSnd>
-        </p:sndAc>
       </p:transition>
     </mc:Choice>
-    <mc:Fallback>
+    <mc:Fallback xmlns="">
       <p:transition spd="slow">
         <p:fade/>
-        <p:sndAc>
-          <p:stSnd>
-            <p:snd r:embed="rId2" name="chimes.wav"/>
-          </p:stSnd>
-        </p:sndAc>
       </p:transition>
     </mc:Fallback>
   </mc:AlternateContent>
@@ -5646,7 +5347,7 @@
           <p:nvPr/>
         </p:nvPicPr>
         <p:blipFill>
-          <a:blip r:embed="rId4">
+          <a:blip r:embed="rId3">
             <a:extLst>
               <a:ext uri="{28A0092B-C50C-407E-A947-70E740481C1C}">
                 <a14:useLocalDpi xmlns:a14="http://schemas.microsoft.com/office/drawing/2010/main" val="0"/>
@@ -5710,7 +5411,7 @@
           <p:nvPr/>
         </p:nvPicPr>
         <p:blipFill>
-          <a:blip r:embed="rId5">
+          <a:blip r:embed="rId4">
             <a:extLst>
               <a:ext uri="{28A0092B-C50C-407E-A947-70E740481C1C}">
                 <a14:useLocalDpi xmlns:a14="http://schemas.microsoft.com/office/drawing/2010/main" val="0"/>
@@ -5775,25 +5476,15 @@
   <p:clrMapOvr>
     <a:masterClrMapping/>
   </p:clrMapOvr>
-  <mc:AlternateContent xmlns:mc="http://schemas.openxmlformats.org/markup-compatibility/2006">
-    <mc:Choice xmlns:p14="http://schemas.microsoft.com/office/powerpoint/2010/main" Requires="p14">
+  <mc:AlternateContent xmlns:mc="http://schemas.openxmlformats.org/markup-compatibility/2006" xmlns:p14="http://schemas.microsoft.com/office/powerpoint/2010/main">
+    <mc:Choice Requires="p14">
       <p:transition spd="slow" p14:dur="1250">
         <p14:flythrough hasBounce="1"/>
-        <p:sndAc>
-          <p:stSnd>
-            <p:snd r:embed="rId2" name="chimes.wav"/>
-          </p:stSnd>
-        </p:sndAc>
       </p:transition>
     </mc:Choice>
-    <mc:Fallback>
+    <mc:Fallback xmlns="">
       <p:transition spd="slow">
         <p:fade/>
-        <p:sndAc>
-          <p:stSnd>
-            <p:snd r:embed="rId2" name="chimes.wav"/>
-          </p:stSnd>
-        </p:sndAc>
       </p:transition>
     </mc:Fallback>
   </mc:AlternateContent>
@@ -5937,7 +5628,7 @@
                                           </p:endCondLst>
                                         </p:cTn>
                                         <p:tgtEl>
-                                          <p:sndTgt r:embed="rId3" name="ToiletFlush.wav"/>
+                                          <p:sndTgt r:embed="rId2" name="ToiletFlush.wav"/>
                                         </p:tgtEl>
                                       </p:cMediaNode>
                                     </p:audio>
@@ -6328,7 +6019,7 @@
           <a:p>
             <a:pPr marL="342900" indent="-342900">
               <a:buBlip>
-                <a:blip r:embed="rId3"/>
+                <a:blip r:embed="rId2"/>
               </a:buBlip>
             </a:pPr>
             <a:r>
@@ -6339,7 +6030,7 @@
           <a:p>
             <a:pPr marL="342900" indent="-342900">
               <a:buBlip>
-                <a:blip r:embed="rId3"/>
+                <a:blip r:embed="rId2"/>
               </a:buBlip>
             </a:pPr>
             <a:r>
@@ -6350,7 +6041,7 @@
           <a:p>
             <a:pPr marL="342900" indent="-342900">
               <a:buBlip>
-                <a:blip r:embed="rId3"/>
+                <a:blip r:embed="rId2"/>
               </a:buBlip>
             </a:pPr>
             <a:r>
@@ -6361,7 +6052,7 @@
           <a:p>
             <a:pPr marL="342900" indent="-342900">
               <a:buBlip>
-                <a:blip r:embed="rId3"/>
+                <a:blip r:embed="rId2"/>
               </a:buBlip>
             </a:pPr>
             <a:r>
@@ -6372,7 +6063,7 @@
           <a:p>
             <a:pPr marL="342900" indent="-342900">
               <a:buBlip>
-                <a:blip r:embed="rId3"/>
+                <a:blip r:embed="rId2"/>
               </a:buBlip>
             </a:pPr>
             <a:r>
@@ -6393,25 +6084,15 @@
   <p:clrMapOvr>
     <a:masterClrMapping/>
   </p:clrMapOvr>
-  <mc:AlternateContent xmlns:mc="http://schemas.openxmlformats.org/markup-compatibility/2006">
-    <mc:Choice xmlns:p14="http://schemas.microsoft.com/office/powerpoint/2010/main" Requires="p14">
+  <mc:AlternateContent xmlns:mc="http://schemas.openxmlformats.org/markup-compatibility/2006" xmlns:p14="http://schemas.microsoft.com/office/powerpoint/2010/main">
+    <mc:Choice Requires="p14">
       <p:transition spd="slow" p14:dur="1250">
         <p14:flythrough hasBounce="1"/>
-        <p:sndAc>
-          <p:stSnd>
-            <p:snd r:embed="rId2" name="chimes.wav"/>
-          </p:stSnd>
-        </p:sndAc>
       </p:transition>
     </mc:Choice>
-    <mc:Fallback>
+    <mc:Fallback xmlns="">
       <p:transition spd="slow">
         <p:fade/>
-        <p:sndAc>
-          <p:stSnd>
-            <p:snd r:embed="rId2" name="chimes.wav"/>
-          </p:stSnd>
-        </p:sndAc>
       </p:transition>
     </mc:Fallback>
   </mc:AlternateContent>
@@ -7106,7 +6787,7 @@
           <a:p>
             <a:pPr marL="342900" indent="-342900">
               <a:buBlip>
-                <a:blip r:embed="rId3"/>
+                <a:blip r:embed="rId2"/>
               </a:buBlip>
             </a:pPr>
             <a:r>
@@ -7122,7 +6803,7 @@
           <a:p>
             <a:pPr marL="342900" indent="-342900">
               <a:buBlip>
-                <a:blip r:embed="rId3"/>
+                <a:blip r:embed="rId2"/>
               </a:buBlip>
             </a:pPr>
             <a:endParaRPr lang="en-US" sz="2800" dirty="0"/>
@@ -7139,25 +6820,15 @@
   <p:clrMapOvr>
     <a:masterClrMapping/>
   </p:clrMapOvr>
-  <mc:AlternateContent xmlns:mc="http://schemas.openxmlformats.org/markup-compatibility/2006">
-    <mc:Choice xmlns:p14="http://schemas.microsoft.com/office/powerpoint/2010/main" Requires="p14">
+  <mc:AlternateContent xmlns:mc="http://schemas.openxmlformats.org/markup-compatibility/2006" xmlns:p14="http://schemas.microsoft.com/office/powerpoint/2010/main">
+    <mc:Choice Requires="p14">
       <p:transition spd="slow" p14:dur="1250">
         <p14:flythrough hasBounce="1"/>
-        <p:sndAc>
-          <p:stSnd>
-            <p:snd r:embed="rId2" name="chimes.wav"/>
-          </p:stSnd>
-        </p:sndAc>
       </p:transition>
     </mc:Choice>
-    <mc:Fallback>
+    <mc:Fallback xmlns="">
       <p:transition spd="slow">
         <p:fade/>
-        <p:sndAc>
-          <p:stSnd>
-            <p:snd r:embed="rId2" name="chimes.wav"/>
-          </p:stSnd>
-        </p:sndAc>
       </p:transition>
     </mc:Fallback>
   </mc:AlternateContent>
@@ -7374,7 +7045,7 @@
           <p:nvPr/>
         </p:nvPicPr>
         <p:blipFill rotWithShape="1">
-          <a:blip r:embed="rId5">
+          <a:blip r:embed="rId4">
             <a:extLst>
               <a:ext uri="{28A0092B-C50C-407E-A947-70E740481C1C}">
                 <a14:useLocalDpi xmlns:a14="http://schemas.microsoft.com/office/drawing/2010/main" val="0"/>
@@ -7436,7 +7107,7 @@
           <p:nvPr/>
         </p:nvPicPr>
         <p:blipFill rotWithShape="1">
-          <a:blip r:embed="rId6">
+          <a:blip r:embed="rId5">
             <a:extLst>
               <a:ext uri="{28A0092B-C50C-407E-A947-70E740481C1C}">
                 <a14:useLocalDpi xmlns:a14="http://schemas.microsoft.com/office/drawing/2010/main" val="0"/>
@@ -7529,25 +7200,15 @@
   <p:clrMapOvr>
     <a:masterClrMapping/>
   </p:clrMapOvr>
-  <mc:AlternateContent xmlns:mc="http://schemas.openxmlformats.org/markup-compatibility/2006">
-    <mc:Choice xmlns:p14="http://schemas.microsoft.com/office/powerpoint/2010/main" Requires="p14">
+  <mc:AlternateContent xmlns:mc="http://schemas.openxmlformats.org/markup-compatibility/2006" xmlns:p14="http://schemas.microsoft.com/office/powerpoint/2010/main">
+    <mc:Choice Requires="p14">
       <p:transition spd="slow" p14:dur="1250">
         <p14:flythrough hasBounce="1"/>
-        <p:sndAc>
-          <p:stSnd>
-            <p:snd r:embed="rId3" name="chimes.wav"/>
-          </p:stSnd>
-        </p:sndAc>
       </p:transition>
     </mc:Choice>
-    <mc:Fallback>
+    <mc:Fallback xmlns="">
       <p:transition spd="slow">
         <p:fade/>
-        <p:sndAc>
-          <p:stSnd>
-            <p:snd r:embed="rId3" name="chimes.wav"/>
-          </p:stSnd>
-        </p:sndAc>
       </p:transition>
     </mc:Fallback>
   </mc:AlternateContent>
@@ -7850,7 +7511,7 @@
                                           </p:endCondLst>
                                         </p:cTn>
                                         <p:tgtEl>
-                                          <p:sndTgt r:embed="rId4" name="explode.wav"/>
+                                          <p:sndTgt r:embed="rId3" name="explode.wav"/>
                                         </p:tgtEl>
                                       </p:cMediaNode>
                                     </p:audio>
@@ -7949,7 +7610,7 @@
           </p:nvPr>
         </p:nvPicPr>
         <p:blipFill rotWithShape="1">
-          <a:blip r:embed="rId3">
+          <a:blip r:embed="rId2">
             <a:extLst>
               <a:ext uri="{28A0092B-C50C-407E-A947-70E740481C1C}">
                 <a14:useLocalDpi xmlns:a14="http://schemas.microsoft.com/office/drawing/2010/main" val="0"/>
@@ -7980,7 +7641,7 @@
           <p:nvPr/>
         </p:nvPicPr>
         <p:blipFill rotWithShape="1">
-          <a:blip r:embed="rId4">
+          <a:blip r:embed="rId3">
             <a:extLst>
               <a:ext uri="{28A0092B-C50C-407E-A947-70E740481C1C}">
                 <a14:useLocalDpi xmlns:a14="http://schemas.microsoft.com/office/drawing/2010/main" val="0"/>
@@ -8015,25 +7676,15 @@
   <p:clrMapOvr>
     <a:masterClrMapping/>
   </p:clrMapOvr>
-  <mc:AlternateContent xmlns:mc="http://schemas.openxmlformats.org/markup-compatibility/2006">
-    <mc:Choice xmlns:p14="http://schemas.microsoft.com/office/powerpoint/2010/main" Requires="p14">
+  <mc:AlternateContent xmlns:mc="http://schemas.openxmlformats.org/markup-compatibility/2006" xmlns:p14="http://schemas.microsoft.com/office/powerpoint/2010/main">
+    <mc:Choice Requires="p14">
       <p:transition spd="slow" p14:dur="1250">
         <p14:flythrough hasBounce="1"/>
-        <p:sndAc>
-          <p:stSnd>
-            <p:snd r:embed="rId2" name="chimes.wav"/>
-          </p:stSnd>
-        </p:sndAc>
       </p:transition>
     </mc:Choice>
-    <mc:Fallback>
+    <mc:Fallback xmlns="">
       <p:transition spd="slow">
         <p:fade/>
-        <p:sndAc>
-          <p:stSnd>
-            <p:snd r:embed="rId2" name="chimes.wav"/>
-          </p:stSnd>
-        </p:sndAc>
       </p:transition>
     </mc:Fallback>
   </mc:AlternateContent>
@@ -8416,25 +8067,15 @@
   <p:clrMapOvr>
     <a:masterClrMapping/>
   </p:clrMapOvr>
-  <mc:AlternateContent xmlns:mc="http://schemas.openxmlformats.org/markup-compatibility/2006">
-    <mc:Choice xmlns:p14="http://schemas.microsoft.com/office/powerpoint/2010/main" Requires="p14">
+  <mc:AlternateContent xmlns:mc="http://schemas.openxmlformats.org/markup-compatibility/2006" xmlns:p14="http://schemas.microsoft.com/office/powerpoint/2010/main">
+    <mc:Choice Requires="p14">
       <p:transition spd="slow" p14:dur="1250">
         <p14:flythrough hasBounce="1"/>
-        <p:sndAc>
-          <p:stSnd>
-            <p:snd r:embed="rId2" name="chimes.wav"/>
-          </p:stSnd>
-        </p:sndAc>
       </p:transition>
     </mc:Choice>
-    <mc:Fallback>
+    <mc:Fallback xmlns="">
       <p:transition spd="slow">
         <p:fade/>
-        <p:sndAc>
-          <p:stSnd>
-            <p:snd r:embed="rId2" name="chimes.wav"/>
-          </p:stSnd>
-        </p:sndAc>
       </p:transition>
     </mc:Fallback>
   </mc:AlternateContent>

</xml_diff>

<commit_message>
More toned-down final presentation.
</commit_message>
<xml_diff>
--- a/docs/Final Presentation.pptx
+++ b/docs/Final Presentation.pptx
@@ -8025,7 +8025,33 @@
           <a:p>
             <a:r>
               <a:rPr lang="en-US" dirty="0" smtClean="0"/>
-              <a:t>Nope. The other things are a lie. As was the cake.</a:t>
+              <a:t>None. </a:t>
+            </a:r>
+            <a:r>
+              <a:rPr lang="en-US" dirty="0" smtClean="0"/>
+              <a:t>The </a:t>
+            </a:r>
+            <a:r>
+              <a:rPr lang="en-US" dirty="0" smtClean="0"/>
+              <a:t>other important </a:t>
+            </a:r>
+            <a:r>
+              <a:rPr lang="en-US" dirty="0" smtClean="0"/>
+              <a:t>things are a lie. </a:t>
+            </a:r>
+            <a:endParaRPr lang="en-US" dirty="0" smtClean="0"/>
+          </a:p>
+          <a:p>
+            <a:endParaRPr lang="en-US" dirty="0"/>
+          </a:p>
+          <a:p>
+            <a:r>
+              <a:rPr lang="en-US" dirty="0" smtClean="0"/>
+              <a:t>And so was </a:t>
+            </a:r>
+            <a:r>
+              <a:rPr lang="en-US" dirty="0" smtClean="0"/>
+              <a:t>the cake.</a:t>
             </a:r>
           </a:p>
           <a:p>
@@ -8674,6 +8700,91 @@
                                           <p:spTgt spid="3">
                                             <p:txEl>
                                               <p:pRg st="18" end="18"/>
+                                            </p:txEl>
+                                          </p:spTgt>
+                                        </p:tgtEl>
+                                        <p:attrNameLst>
+                                          <p:attrName>ppt_y</p:attrName>
+                                        </p:attrNameLst>
+                                      </p:cBhvr>
+                                      <p:tavLst>
+                                        <p:tav tm="0">
+                                          <p:val>
+                                            <p:strVal val="#ppt_y+1"/>
+                                          </p:val>
+                                        </p:tav>
+                                        <p:tav tm="100000">
+                                          <p:val>
+                                            <p:strVal val="#ppt_y-1"/>
+                                          </p:val>
+                                        </p:tav>
+                                      </p:tavLst>
+                                    </p:anim>
+                                  </p:childTnLst>
+                                </p:cTn>
+                              </p:par>
+                              <p:par>
+                                <p:cTn id="33" presetID="28" presetClass="entr" presetSubtype="0" fill="hold" grpId="0" nodeType="withEffect">
+                                  <p:stCondLst>
+                                    <p:cond delay="0"/>
+                                  </p:stCondLst>
+                                  <p:childTnLst>
+                                    <p:set>
+                                      <p:cBhvr>
+                                        <p:cTn id="34" dur="1" fill="hold">
+                                          <p:stCondLst>
+                                            <p:cond delay="0"/>
+                                          </p:stCondLst>
+                                        </p:cTn>
+                                        <p:tgtEl>
+                                          <p:spTgt spid="3">
+                                            <p:txEl>
+                                              <p:pRg st="20" end="20"/>
+                                            </p:txEl>
+                                          </p:spTgt>
+                                        </p:tgtEl>
+                                        <p:attrNameLst>
+                                          <p:attrName>style.visibility</p:attrName>
+                                        </p:attrNameLst>
+                                      </p:cBhvr>
+                                      <p:to>
+                                        <p:strVal val="visible"/>
+                                      </p:to>
+                                    </p:set>
+                                    <p:anim calcmode="lin" valueType="num">
+                                      <p:cBhvr>
+                                        <p:cTn id="35" dur="15000" fill="hold"/>
+                                        <p:tgtEl>
+                                          <p:spTgt spid="3">
+                                            <p:txEl>
+                                              <p:pRg st="20" end="20"/>
+                                            </p:txEl>
+                                          </p:spTgt>
+                                        </p:tgtEl>
+                                        <p:attrNameLst>
+                                          <p:attrName>ppt_x</p:attrName>
+                                        </p:attrNameLst>
+                                      </p:cBhvr>
+                                      <p:tavLst>
+                                        <p:tav tm="0">
+                                          <p:val>
+                                            <p:strVal val="#ppt_x"/>
+                                          </p:val>
+                                        </p:tav>
+                                        <p:tav tm="100000">
+                                          <p:val>
+                                            <p:strVal val="#ppt_x"/>
+                                          </p:val>
+                                        </p:tav>
+                                      </p:tavLst>
+                                    </p:anim>
+                                    <p:anim calcmode="lin" valueType="num">
+                                      <p:cBhvr>
+                                        <p:cTn id="36" dur="15000" fill="hold"/>
+                                        <p:tgtEl>
+                                          <p:spTgt spid="3">
+                                            <p:txEl>
+                                              <p:pRg st="20" end="20"/>
                                             </p:txEl>
                                           </p:spTgt>
                                         </p:tgtEl>

</xml_diff>